<commit_message>
modified:   RacketProject.pptx 	Web_Page_Suff/ 	game_web_page.html
</commit_message>
<xml_diff>
--- a/RacketProject.pptx
+++ b/RacketProject.pptx
@@ -247,7 +247,7 @@
           <a:p>
             <a:fld id="{8B9C5AA4-4FCA-4F47-AAC9-1240DC78B99C}" type="datetimeFigureOut">
               <a:rPr lang="en-US" smtClean="0"/>
-              <a:t>4/7/2016</a:t>
+              <a:t>4/23/2016</a:t>
             </a:fld>
             <a:endParaRPr lang="en-US"/>
           </a:p>
@@ -415,7 +415,7 @@
           <a:p>
             <a:fld id="{8B9C5AA4-4FCA-4F47-AAC9-1240DC78B99C}" type="datetimeFigureOut">
               <a:rPr lang="en-US" smtClean="0"/>
-              <a:t>4/7/2016</a:t>
+              <a:t>4/23/2016</a:t>
             </a:fld>
             <a:endParaRPr lang="en-US"/>
           </a:p>
@@ -593,7 +593,7 @@
           <a:p>
             <a:fld id="{8B9C5AA4-4FCA-4F47-AAC9-1240DC78B99C}" type="datetimeFigureOut">
               <a:rPr lang="en-US" smtClean="0"/>
-              <a:t>4/7/2016</a:t>
+              <a:t>4/23/2016</a:t>
             </a:fld>
             <a:endParaRPr lang="en-US"/>
           </a:p>
@@ -1156,7 +1156,7 @@
           <a:p>
             <a:fld id="{8B9C5AA4-4FCA-4F47-AAC9-1240DC78B99C}" type="datetimeFigureOut">
               <a:rPr lang="en-US" smtClean="0"/>
-              <a:t>4/7/2016</a:t>
+              <a:t>4/23/2016</a:t>
             </a:fld>
             <a:endParaRPr lang="en-US"/>
           </a:p>
@@ -1331,7 +1331,7 @@
           <a:p>
             <a:fld id="{8B9C5AA4-4FCA-4F47-AAC9-1240DC78B99C}" type="datetimeFigureOut">
               <a:rPr lang="en-US" smtClean="0"/>
-              <a:t>4/7/2016</a:t>
+              <a:t>4/23/2016</a:t>
             </a:fld>
             <a:endParaRPr lang="en-US"/>
           </a:p>
@@ -1582,7 +1582,7 @@
           <a:p>
             <a:fld id="{8B9C5AA4-4FCA-4F47-AAC9-1240DC78B99C}" type="datetimeFigureOut">
               <a:rPr lang="en-US" smtClean="0"/>
-              <a:t>4/7/2016</a:t>
+              <a:t>4/23/2016</a:t>
             </a:fld>
             <a:endParaRPr lang="en-US"/>
           </a:p>
@@ -1879,7 +1879,7 @@
           <a:p>
             <a:fld id="{8B9C5AA4-4FCA-4F47-AAC9-1240DC78B99C}" type="datetimeFigureOut">
               <a:rPr lang="en-US" smtClean="0"/>
-              <a:t>4/7/2016</a:t>
+              <a:t>4/23/2016</a:t>
             </a:fld>
             <a:endParaRPr lang="en-US"/>
           </a:p>
@@ -2321,7 +2321,7 @@
           <a:p>
             <a:fld id="{8B9C5AA4-4FCA-4F47-AAC9-1240DC78B99C}" type="datetimeFigureOut">
               <a:rPr lang="en-US" smtClean="0"/>
-              <a:t>4/7/2016</a:t>
+              <a:t>4/23/2016</a:t>
             </a:fld>
             <a:endParaRPr lang="en-US"/>
           </a:p>
@@ -2439,7 +2439,7 @@
           <a:p>
             <a:fld id="{8B9C5AA4-4FCA-4F47-AAC9-1240DC78B99C}" type="datetimeFigureOut">
               <a:rPr lang="en-US" smtClean="0"/>
-              <a:t>4/7/2016</a:t>
+              <a:t>4/23/2016</a:t>
             </a:fld>
             <a:endParaRPr lang="en-US"/>
           </a:p>
@@ -2534,7 +2534,7 @@
           <a:p>
             <a:fld id="{8B9C5AA4-4FCA-4F47-AAC9-1240DC78B99C}" type="datetimeFigureOut">
               <a:rPr lang="en-US" smtClean="0"/>
-              <a:t>4/7/2016</a:t>
+              <a:t>4/23/2016</a:t>
             </a:fld>
             <a:endParaRPr lang="en-US"/>
           </a:p>
@@ -2817,7 +2817,7 @@
           <a:p>
             <a:fld id="{8B9C5AA4-4FCA-4F47-AAC9-1240DC78B99C}" type="datetimeFigureOut">
               <a:rPr lang="en-US" smtClean="0"/>
-              <a:t>4/7/2016</a:t>
+              <a:t>4/23/2016</a:t>
             </a:fld>
             <a:endParaRPr lang="en-US"/>
           </a:p>
@@ -2985,7 +2985,7 @@
           <a:p>
             <a:fld id="{8B9C5AA4-4FCA-4F47-AAC9-1240DC78B99C}" type="datetimeFigureOut">
               <a:rPr lang="en-US" smtClean="0"/>
-              <a:t>4/7/2016</a:t>
+              <a:t>4/23/2016</a:t>
             </a:fld>
             <a:endParaRPr lang="en-US"/>
           </a:p>
@@ -3276,7 +3276,7 @@
           <a:p>
             <a:fld id="{8B9C5AA4-4FCA-4F47-AAC9-1240DC78B99C}" type="datetimeFigureOut">
               <a:rPr lang="en-US" smtClean="0"/>
-              <a:t>4/7/2016</a:t>
+              <a:t>4/23/2016</a:t>
             </a:fld>
             <a:endParaRPr lang="en-US"/>
           </a:p>
@@ -3567,7 +3567,7 @@
           <a:p>
             <a:fld id="{8B9C5AA4-4FCA-4F47-AAC9-1240DC78B99C}" type="datetimeFigureOut">
               <a:rPr lang="en-US" smtClean="0"/>
-              <a:t>4/7/2016</a:t>
+              <a:t>4/23/2016</a:t>
             </a:fld>
             <a:endParaRPr lang="en-US"/>
           </a:p>
@@ -3815,7 +3815,7 @@
           <a:p>
             <a:fld id="{8B9C5AA4-4FCA-4F47-AAC9-1240DC78B99C}" type="datetimeFigureOut">
               <a:rPr lang="en-US" smtClean="0"/>
-              <a:t>4/7/2016</a:t>
+              <a:t>4/23/2016</a:t>
             </a:fld>
             <a:endParaRPr lang="en-US"/>
           </a:p>
@@ -4355,7 +4355,7 @@
           <a:p>
             <a:fld id="{8B9C5AA4-4FCA-4F47-AAC9-1240DC78B99C}" type="datetimeFigureOut">
               <a:rPr lang="en-US" smtClean="0"/>
-              <a:t>4/7/2016</a:t>
+              <a:t>4/23/2016</a:t>
             </a:fld>
             <a:endParaRPr lang="en-US"/>
           </a:p>
@@ -4603,7 +4603,7 @@
           <a:p>
             <a:fld id="{8B9C5AA4-4FCA-4F47-AAC9-1240DC78B99C}" type="datetimeFigureOut">
               <a:rPr lang="en-US" smtClean="0"/>
-              <a:t>4/7/2016</a:t>
+              <a:t>4/23/2016</a:t>
             </a:fld>
             <a:endParaRPr lang="en-US"/>
           </a:p>
@@ -5135,7 +5135,7 @@
           <a:p>
             <a:fld id="{8B9C5AA4-4FCA-4F47-AAC9-1240DC78B99C}" type="datetimeFigureOut">
               <a:rPr lang="en-US" smtClean="0"/>
-              <a:t>4/7/2016</a:t>
+              <a:t>4/23/2016</a:t>
             </a:fld>
             <a:endParaRPr lang="en-US"/>
           </a:p>
@@ -5432,7 +5432,7 @@
           <a:p>
             <a:fld id="{8B9C5AA4-4FCA-4F47-AAC9-1240DC78B99C}" type="datetimeFigureOut">
               <a:rPr lang="en-US" smtClean="0"/>
-              <a:t>4/7/2016</a:t>
+              <a:t>4/23/2016</a:t>
             </a:fld>
             <a:endParaRPr lang="en-US"/>
           </a:p>
@@ -5606,7 +5606,7 @@
           <a:p>
             <a:fld id="{8B9C5AA4-4FCA-4F47-AAC9-1240DC78B99C}" type="datetimeFigureOut">
               <a:rPr lang="en-US" smtClean="0"/>
-              <a:t>4/7/2016</a:t>
+              <a:t>4/23/2016</a:t>
             </a:fld>
             <a:endParaRPr lang="en-US"/>
           </a:p>
@@ -5786,7 +5786,7 @@
           <a:p>
             <a:fld id="{8B9C5AA4-4FCA-4F47-AAC9-1240DC78B99C}" type="datetimeFigureOut">
               <a:rPr lang="en-US" smtClean="0"/>
-              <a:t>4/7/2016</a:t>
+              <a:t>4/23/2016</a:t>
             </a:fld>
             <a:endParaRPr lang="en-US"/>
           </a:p>
@@ -6349,7 +6349,7 @@
           <a:p>
             <a:fld id="{8B9C5AA4-4FCA-4F47-AAC9-1240DC78B99C}" type="datetimeFigureOut">
               <a:rPr lang="en-US" smtClean="0"/>
-              <a:t>4/7/2016</a:t>
+              <a:t>4/23/2016</a:t>
             </a:fld>
             <a:endParaRPr lang="en-US"/>
           </a:p>
@@ -6599,7 +6599,7 @@
           <a:p>
             <a:fld id="{8B9C5AA4-4FCA-4F47-AAC9-1240DC78B99C}" type="datetimeFigureOut">
               <a:rPr lang="en-US" smtClean="0"/>
-              <a:t>4/7/2016</a:t>
+              <a:t>4/23/2016</a:t>
             </a:fld>
             <a:endParaRPr lang="en-US"/>
           </a:p>
@@ -6769,7 +6769,7 @@
           <a:p>
             <a:fld id="{8B9C5AA4-4FCA-4F47-AAC9-1240DC78B99C}" type="datetimeFigureOut">
               <a:rPr lang="en-US" smtClean="0"/>
-              <a:t>4/7/2016</a:t>
+              <a:t>4/23/2016</a:t>
             </a:fld>
             <a:endParaRPr lang="en-US"/>
           </a:p>
@@ -7020,7 +7020,7 @@
           <a:p>
             <a:fld id="{8B9C5AA4-4FCA-4F47-AAC9-1240DC78B99C}" type="datetimeFigureOut">
               <a:rPr lang="en-US" smtClean="0"/>
-              <a:t>4/7/2016</a:t>
+              <a:t>4/23/2016</a:t>
             </a:fld>
             <a:endParaRPr lang="en-US"/>
           </a:p>
@@ -7317,7 +7317,7 @@
           <a:p>
             <a:fld id="{8B9C5AA4-4FCA-4F47-AAC9-1240DC78B99C}" type="datetimeFigureOut">
               <a:rPr lang="en-US" smtClean="0"/>
-              <a:t>4/7/2016</a:t>
+              <a:t>4/23/2016</a:t>
             </a:fld>
             <a:endParaRPr lang="en-US"/>
           </a:p>
@@ -7759,7 +7759,7 @@
           <a:p>
             <a:fld id="{8B9C5AA4-4FCA-4F47-AAC9-1240DC78B99C}" type="datetimeFigureOut">
               <a:rPr lang="en-US" smtClean="0"/>
-              <a:t>4/7/2016</a:t>
+              <a:t>4/23/2016</a:t>
             </a:fld>
             <a:endParaRPr lang="en-US"/>
           </a:p>
@@ -7877,7 +7877,7 @@
           <a:p>
             <a:fld id="{8B9C5AA4-4FCA-4F47-AAC9-1240DC78B99C}" type="datetimeFigureOut">
               <a:rPr lang="en-US" smtClean="0"/>
-              <a:t>4/7/2016</a:t>
+              <a:t>4/23/2016</a:t>
             </a:fld>
             <a:endParaRPr lang="en-US"/>
           </a:p>
@@ -7972,7 +7972,7 @@
           <a:p>
             <a:fld id="{8B9C5AA4-4FCA-4F47-AAC9-1240DC78B99C}" type="datetimeFigureOut">
               <a:rPr lang="en-US" smtClean="0"/>
-              <a:t>4/7/2016</a:t>
+              <a:t>4/23/2016</a:t>
             </a:fld>
             <a:endParaRPr lang="en-US"/>
           </a:p>
@@ -8255,7 +8255,7 @@
           <a:p>
             <a:fld id="{8B9C5AA4-4FCA-4F47-AAC9-1240DC78B99C}" type="datetimeFigureOut">
               <a:rPr lang="en-US" smtClean="0"/>
-              <a:t>4/7/2016</a:t>
+              <a:t>4/23/2016</a:t>
             </a:fld>
             <a:endParaRPr lang="en-US"/>
           </a:p>
@@ -8546,7 +8546,7 @@
           <a:p>
             <a:fld id="{8B9C5AA4-4FCA-4F47-AAC9-1240DC78B99C}" type="datetimeFigureOut">
               <a:rPr lang="en-US" smtClean="0"/>
-              <a:t>4/7/2016</a:t>
+              <a:t>4/23/2016</a:t>
             </a:fld>
             <a:endParaRPr lang="en-US"/>
           </a:p>
@@ -8837,7 +8837,7 @@
           <a:p>
             <a:fld id="{8B9C5AA4-4FCA-4F47-AAC9-1240DC78B99C}" type="datetimeFigureOut">
               <a:rPr lang="en-US" smtClean="0"/>
-              <a:t>4/7/2016</a:t>
+              <a:t>4/23/2016</a:t>
             </a:fld>
             <a:endParaRPr lang="en-US"/>
           </a:p>
@@ -9085,7 +9085,7 @@
           <a:p>
             <a:fld id="{8B9C5AA4-4FCA-4F47-AAC9-1240DC78B99C}" type="datetimeFigureOut">
               <a:rPr lang="en-US" smtClean="0"/>
-              <a:t>4/7/2016</a:t>
+              <a:t>4/23/2016</a:t>
             </a:fld>
             <a:endParaRPr lang="en-US"/>
           </a:p>
@@ -9314,7 +9314,7 @@
           <a:p>
             <a:fld id="{8B9C5AA4-4FCA-4F47-AAC9-1240DC78B99C}" type="datetimeFigureOut">
               <a:rPr lang="en-US" smtClean="0"/>
-              <a:t>4/7/2016</a:t>
+              <a:t>4/23/2016</a:t>
             </a:fld>
             <a:endParaRPr lang="en-US"/>
           </a:p>
@@ -9854,7 +9854,7 @@
           <a:p>
             <a:fld id="{8B9C5AA4-4FCA-4F47-AAC9-1240DC78B99C}" type="datetimeFigureOut">
               <a:rPr lang="en-US" smtClean="0"/>
-              <a:t>4/7/2016</a:t>
+              <a:t>4/23/2016</a:t>
             </a:fld>
             <a:endParaRPr lang="en-US"/>
           </a:p>
@@ -10102,7 +10102,7 @@
           <a:p>
             <a:fld id="{8B9C5AA4-4FCA-4F47-AAC9-1240DC78B99C}" type="datetimeFigureOut">
               <a:rPr lang="en-US" smtClean="0"/>
-              <a:t>4/7/2016</a:t>
+              <a:t>4/23/2016</a:t>
             </a:fld>
             <a:endParaRPr lang="en-US"/>
           </a:p>
@@ -10634,7 +10634,7 @@
           <a:p>
             <a:fld id="{8B9C5AA4-4FCA-4F47-AAC9-1240DC78B99C}" type="datetimeFigureOut">
               <a:rPr lang="en-US" smtClean="0"/>
-              <a:t>4/7/2016</a:t>
+              <a:t>4/23/2016</a:t>
             </a:fld>
             <a:endParaRPr lang="en-US"/>
           </a:p>
@@ -10931,7 +10931,7 @@
           <a:p>
             <a:fld id="{8B9C5AA4-4FCA-4F47-AAC9-1240DC78B99C}" type="datetimeFigureOut">
               <a:rPr lang="en-US" smtClean="0"/>
-              <a:t>4/7/2016</a:t>
+              <a:t>4/23/2016</a:t>
             </a:fld>
             <a:endParaRPr lang="en-US"/>
           </a:p>
@@ -11105,7 +11105,7 @@
           <a:p>
             <a:fld id="{8B9C5AA4-4FCA-4F47-AAC9-1240DC78B99C}" type="datetimeFigureOut">
               <a:rPr lang="en-US" smtClean="0"/>
-              <a:t>4/7/2016</a:t>
+              <a:t>4/23/2016</a:t>
             </a:fld>
             <a:endParaRPr lang="en-US"/>
           </a:p>
@@ -11285,7 +11285,7 @@
           <a:p>
             <a:fld id="{8B9C5AA4-4FCA-4F47-AAC9-1240DC78B99C}" type="datetimeFigureOut">
               <a:rPr lang="en-US" smtClean="0"/>
-              <a:t>4/7/2016</a:t>
+              <a:t>4/23/2016</a:t>
             </a:fld>
             <a:endParaRPr lang="en-US"/>
           </a:p>
@@ -11649,7 +11649,7 @@
           <a:p>
             <a:fld id="{8B9C5AA4-4FCA-4F47-AAC9-1240DC78B99C}" type="datetimeFigureOut">
               <a:rPr lang="en-US" smtClean="0"/>
-              <a:t>4/7/2016</a:t>
+              <a:t>4/23/2016</a:t>
             </a:fld>
             <a:endParaRPr lang="en-US"/>
           </a:p>
@@ -11766,7 +11766,7 @@
           <a:p>
             <a:fld id="{8B9C5AA4-4FCA-4F47-AAC9-1240DC78B99C}" type="datetimeFigureOut">
               <a:rPr lang="en-US" smtClean="0"/>
-              <a:t>4/7/2016</a:t>
+              <a:t>4/23/2016</a:t>
             </a:fld>
             <a:endParaRPr lang="en-US"/>
           </a:p>
@@ -11861,7 +11861,7 @@
           <a:p>
             <a:fld id="{8B9C5AA4-4FCA-4F47-AAC9-1240DC78B99C}" type="datetimeFigureOut">
               <a:rPr lang="en-US" smtClean="0"/>
-              <a:t>4/7/2016</a:t>
+              <a:t>4/23/2016</a:t>
             </a:fld>
             <a:endParaRPr lang="en-US"/>
           </a:p>
@@ -12136,7 +12136,7 @@
           <a:p>
             <a:fld id="{8B9C5AA4-4FCA-4F47-AAC9-1240DC78B99C}" type="datetimeFigureOut">
               <a:rPr lang="en-US" smtClean="0"/>
-              <a:t>4/7/2016</a:t>
+              <a:t>4/23/2016</a:t>
             </a:fld>
             <a:endParaRPr lang="en-US"/>
           </a:p>
@@ -12388,7 +12388,7 @@
           <a:p>
             <a:fld id="{8B9C5AA4-4FCA-4F47-AAC9-1240DC78B99C}" type="datetimeFigureOut">
               <a:rPr lang="en-US" smtClean="0"/>
-              <a:t>4/7/2016</a:t>
+              <a:t>4/23/2016</a:t>
             </a:fld>
             <a:endParaRPr lang="en-US"/>
           </a:p>
@@ -12599,7 +12599,7 @@
           <a:p>
             <a:fld id="{8B9C5AA4-4FCA-4F47-AAC9-1240DC78B99C}" type="datetimeFigureOut">
               <a:rPr lang="en-US" smtClean="0"/>
-              <a:t>4/7/2016</a:t>
+              <a:t>4/23/2016</a:t>
             </a:fld>
             <a:endParaRPr lang="en-US"/>
           </a:p>
@@ -13456,7 +13456,7 @@
           <a:p>
             <a:fld id="{8B9C5AA4-4FCA-4F47-AAC9-1240DC78B99C}" type="datetimeFigureOut">
               <a:rPr lang="en-US" smtClean="0"/>
-              <a:t>4/7/2016</a:t>
+              <a:t>4/23/2016</a:t>
             </a:fld>
             <a:endParaRPr lang="en-US"/>
           </a:p>
@@ -14439,7 +14439,7 @@
           <a:p>
             <a:fld id="{8B9C5AA4-4FCA-4F47-AAC9-1240DC78B99C}" type="datetimeFigureOut">
               <a:rPr lang="en-US" smtClean="0"/>
-              <a:t>4/7/2016</a:t>
+              <a:t>4/23/2016</a:t>
             </a:fld>
             <a:endParaRPr lang="en-US"/>
           </a:p>
@@ -15113,7 +15113,7 @@
         </p:blipFill>
         <p:spPr>
           <a:xfrm>
-            <a:off x="8482231" y="2930769"/>
+            <a:off x="8760024" y="2930769"/>
             <a:ext cx="1419862" cy="1781703"/>
           </a:xfrm>
           <a:prstGeom prst="rect">
@@ -15251,7 +15251,7 @@
                   <a:schemeClr val="bg1"/>
                 </a:solidFill>
               </a:rPr>
-              <a:t>Martin Rudzki                                                        Yusuf </a:t>
+              <a:t>Martin Rudzki                                                           Yusuf </a:t>
             </a:r>
             <a:r>
               <a:rPr lang="en-US" sz="3200" b="1" dirty="0" err="1">
@@ -15510,12 +15510,12 @@
               <a:t>MartinRudzki</a:t>
             </a:r>
             <a:r>
-              <a:rPr lang="en-US" sz="3200" b="1" dirty="0">
+              <a:rPr lang="en-US" sz="3200" b="1">
                 <a:solidFill>
                   <a:schemeClr val="bg1"/>
                 </a:solidFill>
               </a:rPr>
-              <a:t>                                                             </a:t>
+              <a:t>                                                                </a:t>
             </a:r>
             <a:r>
               <a:rPr lang="en-US" sz="3200" b="1" dirty="0" err="1">

</xml_diff>

<commit_message>
modified:   RacketProject.pptx 	modified:   Web_Page_Suff/css/menu.css 	new file:   Web_Page_Suff/img/Martin.jpg 	new file:   Web_Page_Suff/img/Yusuf.jpg 	new file:   Web_Page_Suff/img/game11.jpg 	new file:   Web_Page_Suff/img/game22.jpg 	modified:   Web_Page_Suff/img/game3.JPG 	new file:   Web_Page_Suff/img/game33.jpg 	new file:   Web_Page_Suff/img/helper.jpg 	modified:   game_web_page.html
</commit_message>
<xml_diff>
--- a/RacketProject.pptx
+++ b/RacketProject.pptx
@@ -261,7 +261,7 @@
           <a:p>
             <a:fld id="{8B9C5AA4-4FCA-4F47-AAC9-1240DC78B99C}" type="datetimeFigureOut">
               <a:rPr lang="en-US" smtClean="0"/>
-              <a:t>4/25/2016</a:t>
+              <a:t>4/28/2016</a:t>
             </a:fld>
             <a:endParaRPr lang="en-US"/>
           </a:p>
@@ -429,7 +429,7 @@
           <a:p>
             <a:fld id="{8B9C5AA4-4FCA-4F47-AAC9-1240DC78B99C}" type="datetimeFigureOut">
               <a:rPr lang="en-US" smtClean="0"/>
-              <a:t>4/25/2016</a:t>
+              <a:t>4/28/2016</a:t>
             </a:fld>
             <a:endParaRPr lang="en-US"/>
           </a:p>
@@ -607,7 +607,7 @@
           <a:p>
             <a:fld id="{8B9C5AA4-4FCA-4F47-AAC9-1240DC78B99C}" type="datetimeFigureOut">
               <a:rPr lang="en-US" smtClean="0"/>
-              <a:t>4/25/2016</a:t>
+              <a:t>4/28/2016</a:t>
             </a:fld>
             <a:endParaRPr lang="en-US"/>
           </a:p>
@@ -1170,7 +1170,7 @@
           <a:p>
             <a:fld id="{8B9C5AA4-4FCA-4F47-AAC9-1240DC78B99C}" type="datetimeFigureOut">
               <a:rPr lang="en-US" smtClean="0"/>
-              <a:t>4/25/2016</a:t>
+              <a:t>4/28/2016</a:t>
             </a:fld>
             <a:endParaRPr lang="en-US"/>
           </a:p>
@@ -1345,7 +1345,7 @@
           <a:p>
             <a:fld id="{8B9C5AA4-4FCA-4F47-AAC9-1240DC78B99C}" type="datetimeFigureOut">
               <a:rPr lang="en-US" smtClean="0"/>
-              <a:t>4/25/2016</a:t>
+              <a:t>4/28/2016</a:t>
             </a:fld>
             <a:endParaRPr lang="en-US"/>
           </a:p>
@@ -1596,7 +1596,7 @@
           <a:p>
             <a:fld id="{8B9C5AA4-4FCA-4F47-AAC9-1240DC78B99C}" type="datetimeFigureOut">
               <a:rPr lang="en-US" smtClean="0"/>
-              <a:t>4/25/2016</a:t>
+              <a:t>4/28/2016</a:t>
             </a:fld>
             <a:endParaRPr lang="en-US"/>
           </a:p>
@@ -1893,7 +1893,7 @@
           <a:p>
             <a:fld id="{8B9C5AA4-4FCA-4F47-AAC9-1240DC78B99C}" type="datetimeFigureOut">
               <a:rPr lang="en-US" smtClean="0"/>
-              <a:t>4/25/2016</a:t>
+              <a:t>4/28/2016</a:t>
             </a:fld>
             <a:endParaRPr lang="en-US"/>
           </a:p>
@@ -2335,7 +2335,7 @@
           <a:p>
             <a:fld id="{8B9C5AA4-4FCA-4F47-AAC9-1240DC78B99C}" type="datetimeFigureOut">
               <a:rPr lang="en-US" smtClean="0"/>
-              <a:t>4/25/2016</a:t>
+              <a:t>4/28/2016</a:t>
             </a:fld>
             <a:endParaRPr lang="en-US"/>
           </a:p>
@@ -2453,7 +2453,7 @@
           <a:p>
             <a:fld id="{8B9C5AA4-4FCA-4F47-AAC9-1240DC78B99C}" type="datetimeFigureOut">
               <a:rPr lang="en-US" smtClean="0"/>
-              <a:t>4/25/2016</a:t>
+              <a:t>4/28/2016</a:t>
             </a:fld>
             <a:endParaRPr lang="en-US"/>
           </a:p>
@@ -2548,7 +2548,7 @@
           <a:p>
             <a:fld id="{8B9C5AA4-4FCA-4F47-AAC9-1240DC78B99C}" type="datetimeFigureOut">
               <a:rPr lang="en-US" smtClean="0"/>
-              <a:t>4/25/2016</a:t>
+              <a:t>4/28/2016</a:t>
             </a:fld>
             <a:endParaRPr lang="en-US"/>
           </a:p>
@@ -2831,7 +2831,7 @@
           <a:p>
             <a:fld id="{8B9C5AA4-4FCA-4F47-AAC9-1240DC78B99C}" type="datetimeFigureOut">
               <a:rPr lang="en-US" smtClean="0"/>
-              <a:t>4/25/2016</a:t>
+              <a:t>4/28/2016</a:t>
             </a:fld>
             <a:endParaRPr lang="en-US"/>
           </a:p>
@@ -2999,7 +2999,7 @@
           <a:p>
             <a:fld id="{8B9C5AA4-4FCA-4F47-AAC9-1240DC78B99C}" type="datetimeFigureOut">
               <a:rPr lang="en-US" smtClean="0"/>
-              <a:t>4/25/2016</a:t>
+              <a:t>4/28/2016</a:t>
             </a:fld>
             <a:endParaRPr lang="en-US"/>
           </a:p>
@@ -3290,7 +3290,7 @@
           <a:p>
             <a:fld id="{8B9C5AA4-4FCA-4F47-AAC9-1240DC78B99C}" type="datetimeFigureOut">
               <a:rPr lang="en-US" smtClean="0"/>
-              <a:t>4/25/2016</a:t>
+              <a:t>4/28/2016</a:t>
             </a:fld>
             <a:endParaRPr lang="en-US"/>
           </a:p>
@@ -3581,7 +3581,7 @@
           <a:p>
             <a:fld id="{8B9C5AA4-4FCA-4F47-AAC9-1240DC78B99C}" type="datetimeFigureOut">
               <a:rPr lang="en-US" smtClean="0"/>
-              <a:t>4/25/2016</a:t>
+              <a:t>4/28/2016</a:t>
             </a:fld>
             <a:endParaRPr lang="en-US"/>
           </a:p>
@@ -3829,7 +3829,7 @@
           <a:p>
             <a:fld id="{8B9C5AA4-4FCA-4F47-AAC9-1240DC78B99C}" type="datetimeFigureOut">
               <a:rPr lang="en-US" smtClean="0"/>
-              <a:t>4/25/2016</a:t>
+              <a:t>4/28/2016</a:t>
             </a:fld>
             <a:endParaRPr lang="en-US"/>
           </a:p>
@@ -4369,7 +4369,7 @@
           <a:p>
             <a:fld id="{8B9C5AA4-4FCA-4F47-AAC9-1240DC78B99C}" type="datetimeFigureOut">
               <a:rPr lang="en-US" smtClean="0"/>
-              <a:t>4/25/2016</a:t>
+              <a:t>4/28/2016</a:t>
             </a:fld>
             <a:endParaRPr lang="en-US"/>
           </a:p>
@@ -4617,7 +4617,7 @@
           <a:p>
             <a:fld id="{8B9C5AA4-4FCA-4F47-AAC9-1240DC78B99C}" type="datetimeFigureOut">
               <a:rPr lang="en-US" smtClean="0"/>
-              <a:t>4/25/2016</a:t>
+              <a:t>4/28/2016</a:t>
             </a:fld>
             <a:endParaRPr lang="en-US"/>
           </a:p>
@@ -5149,7 +5149,7 @@
           <a:p>
             <a:fld id="{8B9C5AA4-4FCA-4F47-AAC9-1240DC78B99C}" type="datetimeFigureOut">
               <a:rPr lang="en-US" smtClean="0"/>
-              <a:t>4/25/2016</a:t>
+              <a:t>4/28/2016</a:t>
             </a:fld>
             <a:endParaRPr lang="en-US"/>
           </a:p>
@@ -5446,7 +5446,7 @@
           <a:p>
             <a:fld id="{8B9C5AA4-4FCA-4F47-AAC9-1240DC78B99C}" type="datetimeFigureOut">
               <a:rPr lang="en-US" smtClean="0"/>
-              <a:t>4/25/2016</a:t>
+              <a:t>4/28/2016</a:t>
             </a:fld>
             <a:endParaRPr lang="en-US"/>
           </a:p>
@@ -5620,7 +5620,7 @@
           <a:p>
             <a:fld id="{8B9C5AA4-4FCA-4F47-AAC9-1240DC78B99C}" type="datetimeFigureOut">
               <a:rPr lang="en-US" smtClean="0"/>
-              <a:t>4/25/2016</a:t>
+              <a:t>4/28/2016</a:t>
             </a:fld>
             <a:endParaRPr lang="en-US"/>
           </a:p>
@@ -5800,7 +5800,7 @@
           <a:p>
             <a:fld id="{8B9C5AA4-4FCA-4F47-AAC9-1240DC78B99C}" type="datetimeFigureOut">
               <a:rPr lang="en-US" smtClean="0"/>
-              <a:t>4/25/2016</a:t>
+              <a:t>4/28/2016</a:t>
             </a:fld>
             <a:endParaRPr lang="en-US"/>
           </a:p>
@@ -6363,7 +6363,7 @@
           <a:p>
             <a:fld id="{8B9C5AA4-4FCA-4F47-AAC9-1240DC78B99C}" type="datetimeFigureOut">
               <a:rPr lang="en-US" smtClean="0"/>
-              <a:t>4/25/2016</a:t>
+              <a:t>4/28/2016</a:t>
             </a:fld>
             <a:endParaRPr lang="en-US"/>
           </a:p>
@@ -6613,7 +6613,7 @@
           <a:p>
             <a:fld id="{8B9C5AA4-4FCA-4F47-AAC9-1240DC78B99C}" type="datetimeFigureOut">
               <a:rPr lang="en-US" smtClean="0"/>
-              <a:t>4/25/2016</a:t>
+              <a:t>4/28/2016</a:t>
             </a:fld>
             <a:endParaRPr lang="en-US"/>
           </a:p>
@@ -6783,7 +6783,7 @@
           <a:p>
             <a:fld id="{8B9C5AA4-4FCA-4F47-AAC9-1240DC78B99C}" type="datetimeFigureOut">
               <a:rPr lang="en-US" smtClean="0"/>
-              <a:t>4/25/2016</a:t>
+              <a:t>4/28/2016</a:t>
             </a:fld>
             <a:endParaRPr lang="en-US"/>
           </a:p>
@@ -7034,7 +7034,7 @@
           <a:p>
             <a:fld id="{8B9C5AA4-4FCA-4F47-AAC9-1240DC78B99C}" type="datetimeFigureOut">
               <a:rPr lang="en-US" smtClean="0"/>
-              <a:t>4/25/2016</a:t>
+              <a:t>4/28/2016</a:t>
             </a:fld>
             <a:endParaRPr lang="en-US"/>
           </a:p>
@@ -7331,7 +7331,7 @@
           <a:p>
             <a:fld id="{8B9C5AA4-4FCA-4F47-AAC9-1240DC78B99C}" type="datetimeFigureOut">
               <a:rPr lang="en-US" smtClean="0"/>
-              <a:t>4/25/2016</a:t>
+              <a:t>4/28/2016</a:t>
             </a:fld>
             <a:endParaRPr lang="en-US"/>
           </a:p>
@@ -7773,7 +7773,7 @@
           <a:p>
             <a:fld id="{8B9C5AA4-4FCA-4F47-AAC9-1240DC78B99C}" type="datetimeFigureOut">
               <a:rPr lang="en-US" smtClean="0"/>
-              <a:t>4/25/2016</a:t>
+              <a:t>4/28/2016</a:t>
             </a:fld>
             <a:endParaRPr lang="en-US"/>
           </a:p>
@@ -7891,7 +7891,7 @@
           <a:p>
             <a:fld id="{8B9C5AA4-4FCA-4F47-AAC9-1240DC78B99C}" type="datetimeFigureOut">
               <a:rPr lang="en-US" smtClean="0"/>
-              <a:t>4/25/2016</a:t>
+              <a:t>4/28/2016</a:t>
             </a:fld>
             <a:endParaRPr lang="en-US"/>
           </a:p>
@@ -7986,7 +7986,7 @@
           <a:p>
             <a:fld id="{8B9C5AA4-4FCA-4F47-AAC9-1240DC78B99C}" type="datetimeFigureOut">
               <a:rPr lang="en-US" smtClean="0"/>
-              <a:t>4/25/2016</a:t>
+              <a:t>4/28/2016</a:t>
             </a:fld>
             <a:endParaRPr lang="en-US"/>
           </a:p>
@@ -8269,7 +8269,7 @@
           <a:p>
             <a:fld id="{8B9C5AA4-4FCA-4F47-AAC9-1240DC78B99C}" type="datetimeFigureOut">
               <a:rPr lang="en-US" smtClean="0"/>
-              <a:t>4/25/2016</a:t>
+              <a:t>4/28/2016</a:t>
             </a:fld>
             <a:endParaRPr lang="en-US"/>
           </a:p>
@@ -8560,7 +8560,7 @@
           <a:p>
             <a:fld id="{8B9C5AA4-4FCA-4F47-AAC9-1240DC78B99C}" type="datetimeFigureOut">
               <a:rPr lang="en-US" smtClean="0"/>
-              <a:t>4/25/2016</a:t>
+              <a:t>4/28/2016</a:t>
             </a:fld>
             <a:endParaRPr lang="en-US"/>
           </a:p>
@@ -8851,7 +8851,7 @@
           <a:p>
             <a:fld id="{8B9C5AA4-4FCA-4F47-AAC9-1240DC78B99C}" type="datetimeFigureOut">
               <a:rPr lang="en-US" smtClean="0"/>
-              <a:t>4/25/2016</a:t>
+              <a:t>4/28/2016</a:t>
             </a:fld>
             <a:endParaRPr lang="en-US"/>
           </a:p>
@@ -9099,7 +9099,7 @@
           <a:p>
             <a:fld id="{8B9C5AA4-4FCA-4F47-AAC9-1240DC78B99C}" type="datetimeFigureOut">
               <a:rPr lang="en-US" smtClean="0"/>
-              <a:t>4/25/2016</a:t>
+              <a:t>4/28/2016</a:t>
             </a:fld>
             <a:endParaRPr lang="en-US"/>
           </a:p>
@@ -9328,7 +9328,7 @@
           <a:p>
             <a:fld id="{8B9C5AA4-4FCA-4F47-AAC9-1240DC78B99C}" type="datetimeFigureOut">
               <a:rPr lang="en-US" smtClean="0"/>
-              <a:t>4/25/2016</a:t>
+              <a:t>4/28/2016</a:t>
             </a:fld>
             <a:endParaRPr lang="en-US"/>
           </a:p>
@@ -9868,7 +9868,7 @@
           <a:p>
             <a:fld id="{8B9C5AA4-4FCA-4F47-AAC9-1240DC78B99C}" type="datetimeFigureOut">
               <a:rPr lang="en-US" smtClean="0"/>
-              <a:t>4/25/2016</a:t>
+              <a:t>4/28/2016</a:t>
             </a:fld>
             <a:endParaRPr lang="en-US"/>
           </a:p>
@@ -10116,7 +10116,7 @@
           <a:p>
             <a:fld id="{8B9C5AA4-4FCA-4F47-AAC9-1240DC78B99C}" type="datetimeFigureOut">
               <a:rPr lang="en-US" smtClean="0"/>
-              <a:t>4/25/2016</a:t>
+              <a:t>4/28/2016</a:t>
             </a:fld>
             <a:endParaRPr lang="en-US"/>
           </a:p>
@@ -10648,7 +10648,7 @@
           <a:p>
             <a:fld id="{8B9C5AA4-4FCA-4F47-AAC9-1240DC78B99C}" type="datetimeFigureOut">
               <a:rPr lang="en-US" smtClean="0"/>
-              <a:t>4/25/2016</a:t>
+              <a:t>4/28/2016</a:t>
             </a:fld>
             <a:endParaRPr lang="en-US"/>
           </a:p>
@@ -10945,7 +10945,7 @@
           <a:p>
             <a:fld id="{8B9C5AA4-4FCA-4F47-AAC9-1240DC78B99C}" type="datetimeFigureOut">
               <a:rPr lang="en-US" smtClean="0"/>
-              <a:t>4/25/2016</a:t>
+              <a:t>4/28/2016</a:t>
             </a:fld>
             <a:endParaRPr lang="en-US"/>
           </a:p>
@@ -11119,7 +11119,7 @@
           <a:p>
             <a:fld id="{8B9C5AA4-4FCA-4F47-AAC9-1240DC78B99C}" type="datetimeFigureOut">
               <a:rPr lang="en-US" smtClean="0"/>
-              <a:t>4/25/2016</a:t>
+              <a:t>4/28/2016</a:t>
             </a:fld>
             <a:endParaRPr lang="en-US"/>
           </a:p>
@@ -11299,7 +11299,7 @@
           <a:p>
             <a:fld id="{8B9C5AA4-4FCA-4F47-AAC9-1240DC78B99C}" type="datetimeFigureOut">
               <a:rPr lang="en-US" smtClean="0"/>
-              <a:t>4/25/2016</a:t>
+              <a:t>4/28/2016</a:t>
             </a:fld>
             <a:endParaRPr lang="en-US"/>
           </a:p>
@@ -11663,7 +11663,7 @@
           <a:p>
             <a:fld id="{8B9C5AA4-4FCA-4F47-AAC9-1240DC78B99C}" type="datetimeFigureOut">
               <a:rPr lang="en-US" smtClean="0"/>
-              <a:t>4/25/2016</a:t>
+              <a:t>4/28/2016</a:t>
             </a:fld>
             <a:endParaRPr lang="en-US"/>
           </a:p>
@@ -11780,7 +11780,7 @@
           <a:p>
             <a:fld id="{8B9C5AA4-4FCA-4F47-AAC9-1240DC78B99C}" type="datetimeFigureOut">
               <a:rPr lang="en-US" smtClean="0"/>
-              <a:t>4/25/2016</a:t>
+              <a:t>4/28/2016</a:t>
             </a:fld>
             <a:endParaRPr lang="en-US"/>
           </a:p>
@@ -11875,7 +11875,7 @@
           <a:p>
             <a:fld id="{8B9C5AA4-4FCA-4F47-AAC9-1240DC78B99C}" type="datetimeFigureOut">
               <a:rPr lang="en-US" smtClean="0"/>
-              <a:t>4/25/2016</a:t>
+              <a:t>4/28/2016</a:t>
             </a:fld>
             <a:endParaRPr lang="en-US"/>
           </a:p>
@@ -12150,7 +12150,7 @@
           <a:p>
             <a:fld id="{8B9C5AA4-4FCA-4F47-AAC9-1240DC78B99C}" type="datetimeFigureOut">
               <a:rPr lang="en-US" smtClean="0"/>
-              <a:t>4/25/2016</a:t>
+              <a:t>4/28/2016</a:t>
             </a:fld>
             <a:endParaRPr lang="en-US"/>
           </a:p>
@@ -12402,7 +12402,7 @@
           <a:p>
             <a:fld id="{8B9C5AA4-4FCA-4F47-AAC9-1240DC78B99C}" type="datetimeFigureOut">
               <a:rPr lang="en-US" smtClean="0"/>
-              <a:t>4/25/2016</a:t>
+              <a:t>4/28/2016</a:t>
             </a:fld>
             <a:endParaRPr lang="en-US"/>
           </a:p>
@@ -12613,7 +12613,7 @@
           <a:p>
             <a:fld id="{8B9C5AA4-4FCA-4F47-AAC9-1240DC78B99C}" type="datetimeFigureOut">
               <a:rPr lang="en-US" smtClean="0"/>
-              <a:t>4/25/2016</a:t>
+              <a:t>4/28/2016</a:t>
             </a:fld>
             <a:endParaRPr lang="en-US"/>
           </a:p>
@@ -13470,7 +13470,7 @@
           <a:p>
             <a:fld id="{8B9C5AA4-4FCA-4F47-AAC9-1240DC78B99C}" type="datetimeFigureOut">
               <a:rPr lang="en-US" smtClean="0"/>
-              <a:t>4/25/2016</a:t>
+              <a:t>4/28/2016</a:t>
             </a:fld>
             <a:endParaRPr lang="en-US"/>
           </a:p>
@@ -14453,7 +14453,7 @@
           <a:p>
             <a:fld id="{8B9C5AA4-4FCA-4F47-AAC9-1240DC78B99C}" type="datetimeFigureOut">
               <a:rPr lang="en-US" smtClean="0"/>
-              <a:t>4/25/2016</a:t>
+              <a:t>4/28/2016</a:t>
             </a:fld>
             <a:endParaRPr lang="en-US"/>
           </a:p>
@@ -21926,13 +21926,8 @@
             </a:pPr>
             <a:r>
               <a:rPr lang="en-US" sz="2000" b="1" dirty="0"/>
-              <a:t>How to play:</a:t>
-            </a:r>
-          </a:p>
-          <a:p>
-            <a:pPr marL="0" indent="0">
-              <a:buNone/>
-            </a:pPr>
+              <a:t>How to play: </a:t>
+            </a:r>
             <a:r>
               <a:rPr lang="en-US" sz="2000" dirty="0"/>
               <a:t>This is a two player game. One person will be the </a:t>
@@ -21959,7 +21954,15 @@
             </a:r>
             <a:r>
               <a:rPr lang="en-US" sz="2000" dirty="0"/>
-              <a:t>. Once it is your turn you will be able to spend money to build units and then move your units to take over territories. Once you can not longer take an action hit </a:t>
+              <a:t>. Once it is your turn you will be able to spend money to build units and then move your units to take over territories. </a:t>
+            </a:r>
+            <a:r>
+              <a:rPr lang="en-US" sz="2000" b="1" dirty="0"/>
+              <a:t>To attack</a:t>
+            </a:r>
+            <a:r>
+              <a:rPr lang="en-US" sz="2000" dirty="0"/>
+              <a:t>, move a unit on top of another unit and whoever has the highest dice roll wins, defender had advantage on a tie. Once you can no longer take an action hit </a:t>
             </a:r>
             <a:r>
               <a:rPr lang="en-US" sz="2000" b="1" dirty="0"/>
@@ -21969,13 +21972,6 @@
               <a:rPr lang="en-US" sz="2000" dirty="0"/>
               <a:t> </a:t>
             </a:r>
-          </a:p>
-          <a:p>
-            <a:pPr>
-              <a:buFont typeface="Wingdings" panose="05000000000000000000" pitchFamily="2" charset="2"/>
-              <a:buChar char="§"/>
-            </a:pPr>
-            <a:endParaRPr lang="en-US" sz="2000" dirty="0"/>
           </a:p>
           <a:p>
             <a:pPr>
@@ -22022,13 +22018,13 @@
           <p:nvPr>
             <p:extLst>
               <p:ext uri="{D42A27DB-BD31-4B8C-83A1-F6EECF244321}">
-                <p14:modId xmlns:p14="http://schemas.microsoft.com/office/powerpoint/2010/main" val="3973091974"/>
+                <p14:modId xmlns:p14="http://schemas.microsoft.com/office/powerpoint/2010/main" val="4070963490"/>
               </p:ext>
             </p:extLst>
           </p:nvPr>
         </p:nvGraphicFramePr>
         <p:xfrm>
-          <a:off x="3333750" y="3521789"/>
+          <a:off x="3562350" y="3864689"/>
           <a:ext cx="3981451" cy="1686653"/>
         </p:xfrm>
         <a:graphic>
@@ -22200,8 +22196,19 @@
                           <a:latin typeface="Arial" panose="020B0604020202020204" pitchFamily="34" charset="0"/>
                           <a:cs typeface="Arial" panose="020B0604020202020204" pitchFamily="34" charset="0"/>
                         </a:rPr>
-                        <a:t>?</a:t>
+                        <a:t>1-6</a:t>
                       </a:r>
+                      <a:r>
+                        <a:rPr lang="en-US" baseline="0" dirty="0">
+                          <a:latin typeface="Arial" panose="020B0604020202020204" pitchFamily="34" charset="0"/>
+                          <a:cs typeface="Arial" panose="020B0604020202020204" pitchFamily="34" charset="0"/>
+                        </a:rPr>
+                        <a:t> </a:t>
+                      </a:r>
+                      <a:endParaRPr lang="en-US" dirty="0">
+                        <a:latin typeface="Arial" panose="020B0604020202020204" pitchFamily="34" charset="0"/>
+                        <a:cs typeface="Arial" panose="020B0604020202020204" pitchFamily="34" charset="0"/>
+                      </a:endParaRPr>
                     </a:p>
                   </a:txBody>
                   <a:tcPr/>
@@ -22277,7 +22284,7 @@
                           <a:latin typeface="Arial" panose="020B0604020202020204" pitchFamily="34" charset="0"/>
                           <a:cs typeface="Arial" panose="020B0604020202020204" pitchFamily="34" charset="0"/>
                         </a:rPr>
-                        <a:t>?</a:t>
+                        <a:t>1-6</a:t>
                       </a:r>
                     </a:p>
                   </a:txBody>

</xml_diff>